<commit_message>
Update Group B greatOutdoors_ABHISHEK.pptx
a
</commit_message>
<xml_diff>
--- a/Presentation/Group B greatOutdoors_ABHISHEK.pptx
+++ b/Presentation/Group B greatOutdoors_ABHISHEK.pptx
@@ -6107,7 +6107,7 @@
           <p:cNvPr id="2" name="Title 1">
             <a:extLst>
               <a:ext uri="{FF2B5EF4-FFF2-40B4-BE49-F238E27FC236}">
-                <a16:creationId xmlns:a16="http://schemas.microsoft.com/office/drawing/2014/main" xmlns="" id="{3DE459FE-6616-4ECB-A65C-8FD4C39FAD7A}"/>
+                <a16:creationId xmlns="" xmlns:a16="http://schemas.microsoft.com/office/drawing/2014/main" id="{3DE459FE-6616-4ECB-A65C-8FD4C39FAD7A}"/>
               </a:ext>
             </a:extLst>
           </p:cNvPr>
@@ -6155,7 +6155,7 @@
           <p:cNvPr id="3" name="Subtitle 2">
             <a:extLst>
               <a:ext uri="{FF2B5EF4-FFF2-40B4-BE49-F238E27FC236}">
-                <a16:creationId xmlns:a16="http://schemas.microsoft.com/office/drawing/2014/main" xmlns="" id="{74DD0ECB-3322-428C-8D7C-1FB23DD3AA4D}"/>
+                <a16:creationId xmlns="" xmlns:a16="http://schemas.microsoft.com/office/drawing/2014/main" id="{74DD0ECB-3322-428C-8D7C-1FB23DD3AA4D}"/>
               </a:ext>
             </a:extLst>
           </p:cNvPr>
@@ -6687,7 +6687,7 @@
           <a:lstStyle/>
           <a:p>
             <a:r>
-              <a:rPr lang="en-US" dirty="0" smtClean="0"/>
+              <a:rPr lang="en-US" b="1" dirty="0" smtClean="0"/>
               <a:t>Epic: Salesman should upload offline order in website.</a:t>
             </a:r>
           </a:p>
@@ -6740,7 +6740,7 @@
               </a:buClr>
             </a:pPr>
             <a:r>
-              <a:rPr lang="en-US" dirty="0">
+              <a:rPr lang="en-US" b="1" dirty="0">
                 <a:solidFill>
                   <a:prstClr val="white"/>
                 </a:solidFill>
@@ -6748,7 +6748,7 @@
               <a:t>Epic: Salesman should upload offline </a:t>
             </a:r>
             <a:r>
-              <a:rPr lang="en-US" dirty="0" smtClean="0">
+              <a:rPr lang="en-US" b="1" dirty="0" smtClean="0">
                 <a:solidFill>
                   <a:prstClr val="white"/>
                 </a:solidFill>
@@ -6756,7 +6756,7 @@
               <a:t>returns </a:t>
             </a:r>
             <a:r>
-              <a:rPr lang="en-US" dirty="0">
+              <a:rPr lang="en-US" b="1" dirty="0">
                 <a:solidFill>
                   <a:prstClr val="white"/>
                 </a:solidFill>
@@ -6764,7 +6764,7 @@
               <a:t>in website</a:t>
             </a:r>
             <a:r>
-              <a:rPr lang="en-US" dirty="0" smtClean="0">
+              <a:rPr lang="en-US" b="1" dirty="0" smtClean="0">
                 <a:solidFill>
                   <a:prstClr val="white"/>
                 </a:solidFill>
@@ -6808,8 +6808,21 @@
                   <a:prstClr val="white"/>
                 </a:solidFill>
               </a:rPr>
-              <a:t>Salesman can upload return details by adding reason for returns,</a:t>
-            </a:r>
+              <a:t>Salesman can upload return details by adding reason for </a:t>
+            </a:r>
+            <a:r>
+              <a:rPr lang="en-US" dirty="0" smtClean="0">
+                <a:solidFill>
+                  <a:prstClr val="white"/>
+                </a:solidFill>
+              </a:rPr>
+              <a:t>returns.</a:t>
+            </a:r>
+            <a:endParaRPr lang="en-US" dirty="0" smtClean="0">
+              <a:solidFill>
+                <a:prstClr val="white"/>
+              </a:solidFill>
+            </a:endParaRPr>
           </a:p>
           <a:p>
             <a:pPr marL="457200" lvl="0" indent="-457200">

</xml_diff>